<commit_message>
modifications ppt iphone -> oneplus
</commit_message>
<xml_diff>
--- a/WeBike.pptx
+++ b/WeBike.pptx
@@ -7549,84 +7549,6 @@
       </p:sp>
       <p:pic>
         <p:nvPicPr>
-          <p:cNvPr id="1026" name="Picture 2" descr="http://sawvideo.com/sites/sawvideo/files/uploads/smartphone.jpg"/>
-          <p:cNvPicPr>
-            <a:picLocks noChangeAspect="1" noChangeArrowheads="1"/>
-          </p:cNvPicPr>
-          <p:nvPr/>
-        </p:nvPicPr>
-        <p:blipFill>
-          <a:blip r:embed="rId2" cstate="print">
-            <a:extLst>
-              <a:ext uri="{28A0092B-C50C-407E-A947-70E740481C1C}">
-                <a14:useLocalDpi xmlns:a14="http://schemas.microsoft.com/office/drawing/2010/main" val="0"/>
-              </a:ext>
-            </a:extLst>
-          </a:blip>
-          <a:srcRect/>
-          <a:stretch>
-            <a:fillRect/>
-          </a:stretch>
-        </p:blipFill>
-        <p:spPr bwMode="auto">
-          <a:xfrm>
-            <a:off x="9693343" y="2277020"/>
-            <a:ext cx="2115404" cy="2115405"/>
-          </a:xfrm>
-          <a:prstGeom prst="rect">
-            <a:avLst/>
-          </a:prstGeom>
-          <a:noFill/>
-          <a:extLst>
-            <a:ext uri="{909E8E84-426E-40DD-AFC4-6F175D3DCCD1}">
-              <a14:hiddenFill xmlns:a14="http://schemas.microsoft.com/office/drawing/2010/main">
-                <a:solidFill>
-                  <a:srgbClr val="FFFFFF"/>
-                </a:solidFill>
-              </a14:hiddenFill>
-            </a:ext>
-          </a:extLst>
-        </p:spPr>
-      </p:pic>
-      <p:pic>
-        <p:nvPicPr>
-          <p:cNvPr id="5" name="Image 4"/>
-          <p:cNvPicPr>
-            <a:picLocks noChangeAspect="1"/>
-          </p:cNvPicPr>
-          <p:nvPr/>
-        </p:nvPicPr>
-        <p:blipFill>
-          <a:blip r:embed="rId3">
-            <a:extLst>
-              <a:ext uri="{28A0092B-C50C-407E-A947-70E740481C1C}">
-                <a14:useLocalDpi xmlns:a14="http://schemas.microsoft.com/office/drawing/2010/main" val="0"/>
-              </a:ext>
-            </a:extLst>
-          </a:blip>
-          <a:stretch>
-            <a:fillRect/>
-          </a:stretch>
-        </p:blipFill>
-        <p:spPr>
-          <a:xfrm>
-            <a:off x="9046743" y="3086309"/>
-            <a:ext cx="3408603" cy="496826"/>
-          </a:xfrm>
-          <a:prstGeom prst="rect">
-            <a:avLst/>
-          </a:prstGeom>
-          <a:effectLst>
-            <a:glow rad="63500">
-              <a:schemeClr val="bg1">
-                <a:alpha val="40000"/>
-              </a:schemeClr>
-            </a:glow>
-          </a:effectLst>
-        </p:spPr>
-      </p:pic>
-      <p:pic>
-        <p:nvPicPr>
           <p:cNvPr id="1028" name="Picture 4" descr="http://sebastienamar.com/images/scouap_diapo_ordinateur.png"/>
           <p:cNvPicPr>
             <a:picLocks noChangeAspect="1" noChangeArrowheads="1"/>
@@ -7634,7 +7556,7 @@
           <p:nvPr/>
         </p:nvPicPr>
         <p:blipFill>
-          <a:blip r:embed="rId4">
+          <a:blip r:embed="rId2">
             <a:extLst>
               <a:ext uri="{28A0092B-C50C-407E-A947-70E740481C1C}">
                 <a14:useLocalDpi xmlns:a14="http://schemas.microsoft.com/office/drawing/2010/main" val="0"/>
@@ -7675,7 +7597,7 @@
           <p:nvPr/>
         </p:nvPicPr>
         <p:blipFill rotWithShape="1">
-          <a:blip r:embed="rId5"/>
+          <a:blip r:embed="rId3"/>
           <a:srcRect t="9287" r="1828" b="5854"/>
           <a:stretch/>
         </p:blipFill>
@@ -7762,6 +7684,114 @@
           </a:p>
         </p:txBody>
       </p:sp>
+      <p:pic>
+        <p:nvPicPr>
+          <p:cNvPr id="7" name="Picture 2" descr="http://wiki.cyanogenmod.org/images/thumb/f/f6/Bacon.png/150px-Bacon.png"/>
+          <p:cNvPicPr>
+            <a:picLocks noChangeAspect="1" noChangeArrowheads="1"/>
+          </p:cNvPicPr>
+          <p:nvPr/>
+        </p:nvPicPr>
+        <p:blipFill>
+          <a:blip r:embed="rId4">
+            <a:extLst>
+              <a:ext uri="{28A0092B-C50C-407E-A947-70E740481C1C}">
+                <a14:useLocalDpi xmlns:a14="http://schemas.microsoft.com/office/drawing/2010/main" val="0"/>
+              </a:ext>
+            </a:extLst>
+          </a:blip>
+          <a:srcRect/>
+          <a:stretch>
+            <a:fillRect/>
+          </a:stretch>
+        </p:blipFill>
+        <p:spPr bwMode="auto">
+          <a:xfrm>
+            <a:off x="10171482" y="2157472"/>
+            <a:ext cx="848855" cy="1686393"/>
+          </a:xfrm>
+          <a:prstGeom prst="rect">
+            <a:avLst/>
+          </a:prstGeom>
+          <a:noFill/>
+          <a:extLst>
+            <a:ext uri="{909E8E84-426E-40DD-AFC4-6F175D3DCCD1}">
+              <a14:hiddenFill xmlns:a14="http://schemas.microsoft.com/office/drawing/2010/main">
+                <a:solidFill>
+                  <a:srgbClr val="FFFFFF"/>
+                </a:solidFill>
+              </a14:hiddenFill>
+            </a:ext>
+          </a:extLst>
+        </p:spPr>
+      </p:pic>
+      <p:pic>
+        <p:nvPicPr>
+          <p:cNvPr id="5" name="Image 4"/>
+          <p:cNvPicPr>
+            <a:picLocks noChangeAspect="1"/>
+          </p:cNvPicPr>
+          <p:nvPr/>
+        </p:nvPicPr>
+        <p:blipFill>
+          <a:blip r:embed="rId5">
+            <a:extLst>
+              <a:ext uri="{28A0092B-C50C-407E-A947-70E740481C1C}">
+                <a14:useLocalDpi xmlns:a14="http://schemas.microsoft.com/office/drawing/2010/main" val="0"/>
+              </a:ext>
+            </a:extLst>
+          </a:blip>
+          <a:stretch>
+            <a:fillRect/>
+          </a:stretch>
+        </p:blipFill>
+        <p:spPr>
+          <a:xfrm>
+            <a:off x="7362092" y="2118599"/>
+            <a:ext cx="3408603" cy="496826"/>
+          </a:xfrm>
+          <a:prstGeom prst="rect">
+            <a:avLst/>
+          </a:prstGeom>
+          <a:effectLst>
+            <a:glow rad="63500">
+              <a:schemeClr val="bg1">
+                <a:alpha val="40000"/>
+              </a:schemeClr>
+            </a:glow>
+          </a:effectLst>
+        </p:spPr>
+      </p:pic>
+      <p:pic>
+        <p:nvPicPr>
+          <p:cNvPr id="11" name="Image 10"/>
+          <p:cNvPicPr>
+            <a:picLocks noChangeAspect="1"/>
+          </p:cNvPicPr>
+          <p:nvPr/>
+        </p:nvPicPr>
+        <p:blipFill>
+          <a:blip r:embed="rId6" cstate="print">
+            <a:extLst>
+              <a:ext uri="{28A0092B-C50C-407E-A947-70E740481C1C}">
+                <a14:useLocalDpi xmlns:a14="http://schemas.microsoft.com/office/drawing/2010/main" val="0"/>
+              </a:ext>
+            </a:extLst>
+          </a:blip>
+          <a:stretch>
+            <a:fillRect/>
+          </a:stretch>
+        </p:blipFill>
+        <p:spPr>
+          <a:xfrm>
+            <a:off x="7057822" y="3730835"/>
+            <a:ext cx="1403652" cy="466265"/>
+          </a:xfrm>
+          <a:prstGeom prst="rect">
+            <a:avLst/>
+          </a:prstGeom>
+        </p:spPr>
+      </p:pic>
     </p:spTree>
     <p:extLst>
       <p:ext uri="{BB962C8B-B14F-4D97-AF65-F5344CB8AC3E}">
@@ -8236,6 +8266,47 @@
           </a:p>
         </p:txBody>
       </p:sp>
+      <p:pic>
+        <p:nvPicPr>
+          <p:cNvPr id="16" name="Picture 2" descr="http://www.zdrojak.cz/wp-content/uploads/2014/05/logo-json.png"/>
+          <p:cNvPicPr>
+            <a:picLocks noChangeAspect="1" noChangeArrowheads="1"/>
+          </p:cNvPicPr>
+          <p:nvPr/>
+        </p:nvPicPr>
+        <p:blipFill>
+          <a:blip r:embed="rId6" cstate="print">
+            <a:extLst>
+              <a:ext uri="{28A0092B-C50C-407E-A947-70E740481C1C}">
+                <a14:useLocalDpi xmlns:a14="http://schemas.microsoft.com/office/drawing/2010/main" val="0"/>
+              </a:ext>
+            </a:extLst>
+          </a:blip>
+          <a:srcRect/>
+          <a:stretch>
+            <a:fillRect/>
+          </a:stretch>
+        </p:blipFill>
+        <p:spPr bwMode="auto">
+          <a:xfrm>
+            <a:off x="5548436" y="5104423"/>
+            <a:ext cx="801057" cy="801057"/>
+          </a:xfrm>
+          <a:prstGeom prst="rect">
+            <a:avLst/>
+          </a:prstGeom>
+          <a:noFill/>
+          <a:extLst>
+            <a:ext uri="{909E8E84-426E-40DD-AFC4-6F175D3DCCD1}">
+              <a14:hiddenFill xmlns:a14="http://schemas.microsoft.com/office/drawing/2010/main">
+                <a:solidFill>
+                  <a:srgbClr val="FFFFFF"/>
+                </a:solidFill>
+              </a14:hiddenFill>
+            </a:ext>
+          </a:extLst>
+        </p:spPr>
+      </p:pic>
     </p:spTree>
     <p:extLst>
       <p:ext uri="{BB962C8B-B14F-4D97-AF65-F5344CB8AC3E}">

</xml_diff>